<commit_message>
Fix Google presales validation errors and regenerate Office documents
Fixed validation errors in Google Workspace solution:
- Updated level-of-effort-estimate.csv to use standardized phases (Development, Deployment)
- Updated phase multiplier references (C5, C7, C8, C9, C10, C11)
- Reduced solution-briefing.md Slide 4 bullets from 11 to 7 (within 4-9 requirement)

Regenerated Office documents for both Google solutions:
- discovery-questionnaire.xlsx
- infrastructure-costs.xlsx
- level-of-effort-estimate.xlsx
- solution-briefing.pptx (now successfully generated)
- statement-of-work.docx

All validation checks now pass (5/5 files) for both solutions.
</commit_message>
<xml_diff>
--- a/solutions/google/cloud/landing-zone/presales/solution-briefing.pptx
+++ b/solutions/google/cloud/landing-zone/presales/solution-briefing.pptx
@@ -118,6 +118,9 @@
     <p:ext uri="{EFAFB233-063F-42B5-8137-9DF3F51BA10A}">
       <p15:sldGuideLst xmlns:p15="http://schemas.microsoft.com/office/powerpoint/2012/main"/>
     </p:ext>
+    <p:ext uri="{2D200454-40CA-4A62-9FC3-DE9A4176ACB9}">
+      <p15:notesGuideLst xmlns:p15="http://schemas.microsoft.com/office/powerpoint/2012/main"/>
+    </p:ext>
   </p:extLst>
 </p:presentation>
 </file>
@@ -144,6 +147,59 @@
           <a:chExt cx="0" cy="0"/>
         </a:xfrm>
       </p:grpSpPr>
+      <p:sp>
+        <p:nvSpPr>
+          <p:cNvPr id="2" name="Slide Image Placeholder 1"/>
+          <p:cNvSpPr>
+            <a:spLocks noGrp="1" noRot="1" noChangeAspect="1"/>
+          </p:cNvSpPr>
+          <p:nvPr>
+            <p:ph type="sldImg"/>
+          </p:nvPr>
+        </p:nvSpPr>
+        <p:spPr>
+          <a:xfrm>
+            <a:off x="-171450" y="1143000"/>
+            <a:ext cx="5486400" cy="3086100"/>
+          </a:xfrm>
+          <a:prstGeom prst="rect">
+            <a:avLst/>
+          </a:prstGeom>
+          <a:noFill/>
+          <a:ln w="12700">
+            <a:solidFill>
+              <a:prstClr val="black"/>
+            </a:solidFill>
+          </a:ln>
+        </p:spPr>
+      </p:sp>
+      <p:sp>
+        <p:nvSpPr>
+          <p:cNvPr id="3" name="Notes Placeholder 2"/>
+          <p:cNvSpPr>
+            <a:spLocks noGrp="1"/>
+          </p:cNvSpPr>
+          <p:nvPr>
+            <p:ph type="body" idx="1"/>
+          </p:nvPr>
+        </p:nvSpPr>
+        <p:spPr>
+          <a:xfrm>
+            <a:off x="514350" y="4400550"/>
+            <a:ext cx="4114800" cy="3600450"/>
+          </a:xfrm>
+          <a:prstGeom prst="rect">
+            <a:avLst/>
+          </a:prstGeom>
+        </p:spPr>
+        <p:txBody>
+          <a:bodyPr/>
+          <a:lstStyle/>
+          <a:p>
+            <a:endParaRPr lang="en-US"/>
+          </a:p>
+        </p:txBody>
+      </p:sp>
     </p:spTree>
     <p:extLst>
       <p:ext uri="{BB962C8B-B14F-4D97-AF65-F5344CB8AC3E}">

</xml_diff>

<commit_message>
Fix Google solution briefing content lengths and Investment Summary tables
Content Length Fixes (Success Stories):
- Google Workspace Client: 11 → 9 words (< 10 requirement)
- Google Workspace Solution: 38 → 16 words (< 20 requirement)
- Google Workspace Results: 42 → 22 words (< 40 requirement)
- Google Cloud Landing Zone Client: 12 → 9 words (< 10 requirement)
- Google Cloud Landing Zone Solution: 32 → 13 words (< 20 requirement)
- Google Cloud Landing Zone Results: 49 → 29 words (< 40 requirement)

Investment Summary Table Fix:
- Added Cloud Infrastructure ($0) and Support & Maintenance ($0) rows
- Google Workspace now displays all 4 cost categories
- Matches AWS IDP reference format with complete category breakdown

All validation checks pass (5/5 files) for both Google solutions.
Regenerated all Office documents (XLSX, PPTX, DOCX).
</commit_message>
<xml_diff>
--- a/solutions/google/cloud/landing-zone/presales/solution-briefing.pptx
+++ b/solutions/google/cloud/landing-zone/presales/solution-briefing.pptx
@@ -5645,7 +5645,7 @@
               <a:t>Client:</a:t>
             </a:r>
             <a:r>
-              <a:t> Regional bank with $50B assets expanding digital banking across 8 states</a:t>
+              <a:t> Regional bank with $50B assets across 8 states</a:t>
             </a:r>
           </a:p>
           <a:p>
@@ -5665,7 +5665,7 @@
               <a:t>Solution:</a:t>
             </a:r>
             <a:r>
-              <a:t> Deployed Google Cloud Landing Zone with Cloud Foundation Toolkit Terraform automation. Implemented Shared VPC hub-spoke network and Security Command Center Premium. Established self-service project provisioning with enforced security policies.</a:t>
+              <a:t> Deployed Cloud Landing Zone with Terraform automation and Security Command Center Premium.</a:t>
             </a:r>
           </a:p>
           <a:p>
@@ -5675,7 +5675,7 @@
               <a:t>Results:</a:t>
             </a:r>
             <a:r>
-              <a:t> 95% reduction in provisioning time (6 weeks to 4 hours) and zero security misconfigurations in 6 months. $3.8M annual savings from reduced manual work and security incidents. SOC 2 and PCI-DSS compliance achieved with 100% audit pass rate. Full ROI in 14 months.</a:t>
+              <a:t> 95% faster provisioning (6 weeks to 4 hours). Zero security misconfigurations. $3.8M annual savings. SOC 2 and PCI-DSS compliance achieved. Full ROI in 14 months.</a:t>
             </a:r>
           </a:p>
           <a:p>

</xml_diff>